<commit_message>
announcements and OH updates
</commit_message>
<xml_diff>
--- a/slides/dailyannouncements.pptx
+++ b/slides/dailyannouncements.pptx
@@ -5,19 +5,20 @@
     <p:sldMasterId id="2147483752" r:id="rId1"/>
   </p:sldMasterIdLst>
   <p:notesMasterIdLst>
-    <p:notesMasterId r:id="rId4"/>
+    <p:notesMasterId r:id="rId5"/>
   </p:notesMasterIdLst>
   <p:handoutMasterIdLst>
-    <p:handoutMasterId r:id="rId5"/>
+    <p:handoutMasterId r:id="rId6"/>
   </p:handoutMasterIdLst>
   <p:sldIdLst>
     <p:sldId id="447" r:id="rId2"/>
     <p:sldId id="505" r:id="rId3"/>
+    <p:sldId id="506" r:id="rId4"/>
   </p:sldIdLst>
   <p:sldSz cx="12192000" cy="6858000"/>
   <p:notesSz cx="7315200" cy="9601200"/>
   <p:custDataLst>
-    <p:tags r:id="rId6"/>
+    <p:tags r:id="rId7"/>
   </p:custDataLst>
   <p:defaultTextStyle>
     <a:defPPr>
@@ -1105,7 +1106,7 @@
             <a:fld id="{E4886CB5-510A-4EF6-9466-BC7A8F0DDE87}" type="datetime1">
               <a:rPr lang="en-US" smtClean="0"/>
               <a:pPr/>
-              <a:t>8/26/22</a:t>
+              <a:t>8/29/22</a:t>
             </a:fld>
             <a:endParaRPr lang="en-US"/>
           </a:p>
@@ -1442,7 +1443,7 @@
             <a:fld id="{9B297853-24B4-4D05-83E4-0AD2E86C55E5}" type="datetime1">
               <a:rPr lang="en-US" smtClean="0"/>
               <a:pPr/>
-              <a:t>8/26/22</a:t>
+              <a:t>8/29/22</a:t>
             </a:fld>
             <a:endParaRPr lang="en-US"/>
           </a:p>
@@ -1747,7 +1748,7 @@
             <a:fld id="{01FCDD9E-5768-4705-9537-0C020B1BB310}" type="datetime1">
               <a:rPr lang="en-US" smtClean="0"/>
               <a:pPr/>
-              <a:t>8/26/22</a:t>
+              <a:t>8/29/22</a:t>
             </a:fld>
             <a:endParaRPr lang="en-US"/>
           </a:p>
@@ -1997,7 +1998,7 @@
             <a:fld id="{4257C27E-59C2-41CA-9776-94955CBEE440}" type="datetime1">
               <a:rPr lang="en-US" smtClean="0"/>
               <a:pPr/>
-              <a:t>8/26/22</a:t>
+              <a:t>8/29/22</a:t>
             </a:fld>
             <a:endParaRPr lang="en-US"/>
           </a:p>
@@ -2407,7 +2408,7 @@
             <a:fld id="{03180747-A137-49C6-9C74-AB7EE86F4904}" type="datetime1">
               <a:rPr lang="en-US" smtClean="0"/>
               <a:pPr/>
-              <a:t>8/26/22</a:t>
+              <a:t>8/29/22</a:t>
             </a:fld>
             <a:endParaRPr lang="en-US"/>
           </a:p>
@@ -2724,7 +2725,7 @@
             <a:fld id="{EBBA31D9-ADC1-480D-86A8-1EAFB6A86A35}" type="datetime1">
               <a:rPr lang="en-US" smtClean="0"/>
               <a:pPr/>
-              <a:t>8/26/22</a:t>
+              <a:t>8/29/22</a:t>
             </a:fld>
             <a:endParaRPr lang="en-US"/>
           </a:p>
@@ -3271,7 +3272,7 @@
             <a:fld id="{80AAE9AE-3B2F-4DEA-8C41-BDDF4CDF6F40}" type="datetime1">
               <a:rPr lang="en-US" smtClean="0"/>
               <a:pPr/>
-              <a:t>8/26/22</a:t>
+              <a:t>8/29/22</a:t>
             </a:fld>
             <a:endParaRPr lang="en-US"/>
           </a:p>
@@ -3469,7 +3470,7 @@
             <a:fld id="{48252F7F-E8FE-413B-8521-D4ED924C6DE5}" type="datetime1">
               <a:rPr lang="en-US" smtClean="0"/>
               <a:pPr/>
-              <a:t>8/26/22</a:t>
+              <a:t>8/29/22</a:t>
             </a:fld>
             <a:endParaRPr lang="en-US"/>
           </a:p>
@@ -3685,7 +3686,7 @@
             <a:fld id="{2FF1B124-70E3-4E4A-90E2-6B55DB7659B3}" type="datetime1">
               <a:rPr lang="en-US" smtClean="0"/>
               <a:pPr/>
-              <a:t>8/26/22</a:t>
+              <a:t>8/29/22</a:t>
             </a:fld>
             <a:endParaRPr lang="en-US"/>
           </a:p>
@@ -4057,7 +4058,7 @@
             <a:fld id="{4EBF4C98-3CD6-4C87-BD40-5718C2628835}" type="datetime1">
               <a:rPr lang="en-US" smtClean="0"/>
               <a:pPr/>
-              <a:t>8/26/22</a:t>
+              <a:t>8/29/22</a:t>
             </a:fld>
             <a:endParaRPr lang="en-US"/>
           </a:p>
@@ -4463,7 +4464,7 @@
             <a:fld id="{6D6408A8-6B1B-4CDA-875E-7BEECDBA31DF}" type="datetime1">
               <a:rPr lang="en-US" smtClean="0"/>
               <a:pPr/>
-              <a:t>8/26/22</a:t>
+              <a:t>8/29/22</a:t>
             </a:fld>
             <a:endParaRPr lang="en-US"/>
           </a:p>
@@ -4804,7 +4805,7 @@
             <a:fld id="{C55AAF07-D2F5-4B3C-B443-40DE8C337A77}" type="datetime1">
               <a:rPr lang="en-US" smtClean="0"/>
               <a:pPr/>
-              <a:t>8/26/22</a:t>
+              <a:t>8/29/22</a:t>
             </a:fld>
             <a:endParaRPr lang="en-US"/>
           </a:p>
@@ -5678,6 +5679,196 @@
 </p:sld>
 </file>
 
+<file path=ppt/slides/slide3.xml><?xml version="1.0" encoding="utf-8"?>
+<p:sld xmlns:a="http://schemas.openxmlformats.org/drawingml/2006/main" xmlns:r="http://schemas.openxmlformats.org/officeDocument/2006/relationships" xmlns:p="http://schemas.openxmlformats.org/presentationml/2006/main">
+  <p:cSld>
+    <p:spTree>
+      <p:nvGrpSpPr>
+        <p:cNvPr id="1" name=""/>
+        <p:cNvGrpSpPr/>
+        <p:nvPr/>
+      </p:nvGrpSpPr>
+      <p:grpSpPr>
+        <a:xfrm>
+          <a:off x="0" y="0"/>
+          <a:ext cx="0" cy="0"/>
+          <a:chOff x="0" y="0"/>
+          <a:chExt cx="0" cy="0"/>
+        </a:xfrm>
+      </p:grpSpPr>
+      <p:sp>
+        <p:nvSpPr>
+          <p:cNvPr id="6146" name="Rectangle 2"/>
+          <p:cNvSpPr>
+            <a:spLocks noGrp="1" noChangeArrowheads="1"/>
+          </p:cNvSpPr>
+          <p:nvPr>
+            <p:ph type="title"/>
+            <p:custDataLst>
+              <p:tags r:id="rId1"/>
+            </p:custDataLst>
+          </p:nvPr>
+        </p:nvSpPr>
+        <p:spPr>
+          <a:xfrm>
+            <a:off x="2611808" y="533401"/>
+            <a:ext cx="7958331" cy="762000"/>
+          </a:xfrm>
+        </p:spPr>
+        <p:txBody>
+          <a:bodyPr/>
+          <a:lstStyle/>
+          <a:p>
+            <a:r>
+              <a:rPr lang="en-US" dirty="0"/>
+              <a:t>Monday, Aug. 29</a:t>
+            </a:r>
+          </a:p>
+        </p:txBody>
+      </p:sp>
+      <p:sp>
+        <p:nvSpPr>
+          <p:cNvPr id="6147" name="Rectangle 3"/>
+          <p:cNvSpPr>
+            <a:spLocks noGrp="1" noChangeArrowheads="1"/>
+          </p:cNvSpPr>
+          <p:nvPr>
+            <p:ph idx="1"/>
+            <p:custDataLst>
+              <p:tags r:id="rId2"/>
+            </p:custDataLst>
+          </p:nvPr>
+        </p:nvSpPr>
+        <p:spPr>
+          <a:xfrm>
+            <a:off x="1676400" y="1143000"/>
+            <a:ext cx="8991600" cy="5410200"/>
+          </a:xfrm>
+        </p:spPr>
+        <p:txBody>
+          <a:bodyPr>
+            <a:normAutofit lnSpcReduction="10000"/>
+          </a:bodyPr>
+          <a:lstStyle/>
+          <a:p>
+            <a:r>
+              <a:rPr lang="en-US" dirty="0"/>
+              <a:t>Any Questions on the course structure / syllabus?</a:t>
+            </a:r>
+          </a:p>
+          <a:p>
+            <a:pPr lvl="1"/>
+            <a:r>
+              <a:rPr lang="en-US" dirty="0"/>
+              <a:t>We will go over a couple quick last items today (won’t take long)</a:t>
+            </a:r>
+          </a:p>
+          <a:p>
+            <a:r>
+              <a:rPr lang="en-US" dirty="0"/>
+              <a:t>Please join the Discord Server: </a:t>
+            </a:r>
+            <a:r>
+              <a:rPr lang="en-US" dirty="0">
+                <a:hlinkClick r:id="rId4"/>
+              </a:rPr>
+              <a:t>https://discord.gg/x7Vf8sUa</a:t>
+            </a:r>
+            <a:endParaRPr lang="en-US" dirty="0"/>
+          </a:p>
+          <a:p>
+            <a:pPr lvl="1"/>
+            <a:r>
+              <a:rPr lang="en-US" dirty="0"/>
+              <a:t>It is mostly set up now. Expect a few small changes though.</a:t>
+            </a:r>
+          </a:p>
+          <a:p>
+            <a:r>
+              <a:rPr lang="en-US" dirty="0"/>
+              <a:t>Website Updates! </a:t>
+            </a:r>
+          </a:p>
+          <a:p>
+            <a:pPr lvl="1"/>
+            <a:r>
+              <a:rPr lang="en-US" dirty="0"/>
+              <a:t>Office hours finalized on website. Head TA info is on website as well.</a:t>
+            </a:r>
+          </a:p>
+          <a:p>
+            <a:pPr lvl="1"/>
+            <a:r>
+              <a:rPr lang="en-US" dirty="0"/>
+              <a:t>We will have a weekly discussion section with Grad TA on Tuesdays 3-4</a:t>
+            </a:r>
+          </a:p>
+          <a:p>
+            <a:pPr lvl="2"/>
+            <a:r>
+              <a:rPr lang="en-US" dirty="0"/>
+              <a:t>Starts NEXT week. I’ll set up a room and such for that soon.</a:t>
+            </a:r>
+          </a:p>
+          <a:p>
+            <a:r>
+              <a:rPr lang="en-US" dirty="0" err="1"/>
+              <a:t>Gradescope</a:t>
+            </a:r>
+            <a:endParaRPr lang="en-US" dirty="0"/>
+          </a:p>
+          <a:p>
+            <a:pPr lvl="1"/>
+            <a:r>
+              <a:rPr lang="en-US" dirty="0"/>
+              <a:t>Is configured for first 2 modules now. Deadline set to recommended deadline.</a:t>
+            </a:r>
+          </a:p>
+          <a:p>
+            <a:r>
+              <a:rPr lang="en-US" dirty="0"/>
+              <a:t>Today we continue module 1 (graphs) and begin discussing BFS</a:t>
+            </a:r>
+          </a:p>
+        </p:txBody>
+      </p:sp>
+      <p:sp>
+        <p:nvSpPr>
+          <p:cNvPr id="4" name="Slide Number Placeholder 3"/>
+          <p:cNvSpPr>
+            <a:spLocks noGrp="1"/>
+          </p:cNvSpPr>
+          <p:nvPr>
+            <p:ph type="sldNum" sz="quarter" idx="12"/>
+          </p:nvPr>
+        </p:nvSpPr>
+        <p:spPr/>
+        <p:txBody>
+          <a:bodyPr/>
+          <a:lstStyle/>
+          <a:p>
+            <a:fld id="{F26D9103-0C5C-48AC-B68E-3ED2C1647047}" type="slidenum">
+              <a:rPr lang="en-US" smtClean="0"/>
+              <a:pPr/>
+              <a:t>3</a:t>
+            </a:fld>
+            <a:endParaRPr lang="en-US" dirty="0"/>
+          </a:p>
+        </p:txBody>
+      </p:sp>
+    </p:spTree>
+    <p:extLst>
+      <p:ext uri="{BB962C8B-B14F-4D97-AF65-F5344CB8AC3E}">
+        <p14:creationId xmlns:p14="http://schemas.microsoft.com/office/powerpoint/2010/main" val="4150809055"/>
+      </p:ext>
+    </p:extLst>
+  </p:cSld>
+  <p:clrMapOvr>
+    <a:masterClrMapping/>
+  </p:clrMapOvr>
+</p:sld>
+</file>
+
 <file path=ppt/tags/tag1.xml><?xml version="1.0" encoding="utf-8"?>
 <p:tagLst xmlns:a="http://schemas.openxmlformats.org/drawingml/2006/main" xmlns:r="http://schemas.openxmlformats.org/officeDocument/2006/relationships" xmlns:p="http://schemas.openxmlformats.org/presentationml/2006/main">
   <p:tag name="_INSTRUCTOR VIEW19C14C36-AC8E-43BC-9DB6-C2AAF774C7DC|PANE__TAG" val="_"/>
@@ -5691,6 +5882,18 @@
 </file>
 
 <file path=ppt/tags/tag3.xml><?xml version="1.0" encoding="utf-8"?>
+<p:tagLst xmlns:a="http://schemas.openxmlformats.org/drawingml/2006/main" xmlns:r="http://schemas.openxmlformats.org/officeDocument/2006/relationships" xmlns:p="http://schemas.openxmlformats.org/presentationml/2006/main">
+  <p:tag name="_INSTRUCTOR VIEW19C14C36-AC8E-43BC-9DB6-C2AAF774C7DC|PANE__TAG" val="_"/>
+</p:tagLst>
+</file>
+
+<file path=ppt/tags/tag4.xml><?xml version="1.0" encoding="utf-8"?>
+<p:tagLst xmlns:a="http://schemas.openxmlformats.org/drawingml/2006/main" xmlns:r="http://schemas.openxmlformats.org/officeDocument/2006/relationships" xmlns:p="http://schemas.openxmlformats.org/presentationml/2006/main">
+  <p:tag name="_INSTRUCTOR VIEW19C14C36-AC8E-43BC-9DB6-C2AAF774C7DC|PANE__TAG" val="_"/>
+</p:tagLst>
+</file>
+
+<file path=ppt/tags/tag5.xml><?xml version="1.0" encoding="utf-8"?>
 <p:tagLst xmlns:a="http://schemas.openxmlformats.org/drawingml/2006/main" xmlns:r="http://schemas.openxmlformats.org/officeDocument/2006/relationships" xmlns:p="http://schemas.openxmlformats.org/presentationml/2006/main">
   <p:tag name="_INSTRUCTOR VIEW19C14C36-AC8E-43BC-9DB6-C2AAF774C7DC|PANE__TAG" val="_"/>
 </p:tagLst>

</xml_diff>

<commit_message>
adding module 6 slides
</commit_message>
<xml_diff>
--- a/slides/dailyannouncements.pptx
+++ b/slides/dailyannouncements.pptx
@@ -6496,21 +6496,7 @@
           <a:p>
             <a:r>
               <a:rPr lang="en-US" dirty="0"/>
-              <a:t>Please join the Discord Server: </a:t>
-            </a:r>
-            <a:r>
-              <a:rPr lang="en-US" dirty="0">
-                <a:hlinkClick r:id="rId4"/>
-              </a:rPr>
-              <a:t>https://discord.gg/x7Vf8sUa</a:t>
-            </a:r>
-            <a:endParaRPr lang="en-US" dirty="0"/>
-          </a:p>
-          <a:p>
-            <a:pPr lvl="1"/>
-            <a:r>
-              <a:rPr lang="en-US" dirty="0"/>
-              <a:t>It is mostly set up now. Expect a few small changes though.</a:t>
+              <a:t>Please join the Discord Server (New invite on Piazza I believe)</a:t>
             </a:r>
           </a:p>
           <a:p>
@@ -6544,13 +6530,20 @@
           <a:p>
             <a:r>
               <a:rPr lang="en-US" dirty="0"/>
-              <a:t>Any issues with OH so far? Any adjustments we need to make?</a:t>
+              <a:t>Quick comment about online vs. in-person OH</a:t>
             </a:r>
           </a:p>
           <a:p>
             <a:r>
               <a:rPr lang="en-US" dirty="0"/>
               <a:t>First discussion section was yesterday. Sounds like it went well but we might move to a room that is more private.</a:t>
+            </a:r>
+          </a:p>
+          <a:p>
+            <a:pPr lvl="1"/>
+            <a:r>
+              <a:rPr lang="en-US" dirty="0"/>
+              <a:t>Next week’s discussion section will be on the sorting material you 2150 folks missed!!</a:t>
             </a:r>
           </a:p>
           <a:p>

</xml_diff>

<commit_message>
slide updates for today
</commit_message>
<xml_diff>
--- a/slides/dailyannouncements.pptx
+++ b/slides/dailyannouncements.pptx
@@ -5,10 +5,10 @@
     <p:sldMasterId id="2147483752" r:id="rId1"/>
   </p:sldMasterIdLst>
   <p:notesMasterIdLst>
-    <p:notesMasterId r:id="rId9"/>
+    <p:notesMasterId r:id="rId10"/>
   </p:notesMasterIdLst>
   <p:handoutMasterIdLst>
-    <p:handoutMasterId r:id="rId10"/>
+    <p:handoutMasterId r:id="rId11"/>
   </p:handoutMasterIdLst>
   <p:sldIdLst>
     <p:sldId id="447" r:id="rId2"/>
@@ -18,11 +18,12 @@
     <p:sldId id="508" r:id="rId6"/>
     <p:sldId id="509" r:id="rId7"/>
     <p:sldId id="510" r:id="rId8"/>
+    <p:sldId id="511" r:id="rId9"/>
   </p:sldIdLst>
   <p:sldSz cx="12192000" cy="6858000"/>
   <p:notesSz cx="7315200" cy="9601200"/>
   <p:custDataLst>
-    <p:tags r:id="rId11"/>
+    <p:tags r:id="rId12"/>
   </p:custDataLst>
   <p:defaultTextStyle>
     <a:defPPr>
@@ -1110,7 +1111,7 @@
             <a:fld id="{E4886CB5-510A-4EF6-9466-BC7A8F0DDE87}" type="datetime1">
               <a:rPr lang="en-US" smtClean="0"/>
               <a:pPr/>
-              <a:t>9/7/22</a:t>
+              <a:t>9/9/22</a:t>
             </a:fld>
             <a:endParaRPr lang="en-US"/>
           </a:p>
@@ -1447,7 +1448,7 @@
             <a:fld id="{9B297853-24B4-4D05-83E4-0AD2E86C55E5}" type="datetime1">
               <a:rPr lang="en-US" smtClean="0"/>
               <a:pPr/>
-              <a:t>9/7/22</a:t>
+              <a:t>9/9/22</a:t>
             </a:fld>
             <a:endParaRPr lang="en-US"/>
           </a:p>
@@ -1752,7 +1753,7 @@
             <a:fld id="{01FCDD9E-5768-4705-9537-0C020B1BB310}" type="datetime1">
               <a:rPr lang="en-US" smtClean="0"/>
               <a:pPr/>
-              <a:t>9/7/22</a:t>
+              <a:t>9/9/22</a:t>
             </a:fld>
             <a:endParaRPr lang="en-US"/>
           </a:p>
@@ -2002,7 +2003,7 @@
             <a:fld id="{4257C27E-59C2-41CA-9776-94955CBEE440}" type="datetime1">
               <a:rPr lang="en-US" smtClean="0"/>
               <a:pPr/>
-              <a:t>9/7/22</a:t>
+              <a:t>9/9/22</a:t>
             </a:fld>
             <a:endParaRPr lang="en-US"/>
           </a:p>
@@ -2412,7 +2413,7 @@
             <a:fld id="{03180747-A137-49C6-9C74-AB7EE86F4904}" type="datetime1">
               <a:rPr lang="en-US" smtClean="0"/>
               <a:pPr/>
-              <a:t>9/7/22</a:t>
+              <a:t>9/9/22</a:t>
             </a:fld>
             <a:endParaRPr lang="en-US"/>
           </a:p>
@@ -2729,7 +2730,7 @@
             <a:fld id="{EBBA31D9-ADC1-480D-86A8-1EAFB6A86A35}" type="datetime1">
               <a:rPr lang="en-US" smtClean="0"/>
               <a:pPr/>
-              <a:t>9/7/22</a:t>
+              <a:t>9/9/22</a:t>
             </a:fld>
             <a:endParaRPr lang="en-US"/>
           </a:p>
@@ -3276,7 +3277,7 @@
             <a:fld id="{80AAE9AE-3B2F-4DEA-8C41-BDDF4CDF6F40}" type="datetime1">
               <a:rPr lang="en-US" smtClean="0"/>
               <a:pPr/>
-              <a:t>9/7/22</a:t>
+              <a:t>9/9/22</a:t>
             </a:fld>
             <a:endParaRPr lang="en-US"/>
           </a:p>
@@ -3474,7 +3475,7 @@
             <a:fld id="{48252F7F-E8FE-413B-8521-D4ED924C6DE5}" type="datetime1">
               <a:rPr lang="en-US" smtClean="0"/>
               <a:pPr/>
-              <a:t>9/7/22</a:t>
+              <a:t>9/9/22</a:t>
             </a:fld>
             <a:endParaRPr lang="en-US"/>
           </a:p>
@@ -3690,7 +3691,7 @@
             <a:fld id="{2FF1B124-70E3-4E4A-90E2-6B55DB7659B3}" type="datetime1">
               <a:rPr lang="en-US" smtClean="0"/>
               <a:pPr/>
-              <a:t>9/7/22</a:t>
+              <a:t>9/9/22</a:t>
             </a:fld>
             <a:endParaRPr lang="en-US"/>
           </a:p>
@@ -4062,7 +4063,7 @@
             <a:fld id="{4EBF4C98-3CD6-4C87-BD40-5718C2628835}" type="datetime1">
               <a:rPr lang="en-US" smtClean="0"/>
               <a:pPr/>
-              <a:t>9/7/22</a:t>
+              <a:t>9/9/22</a:t>
             </a:fld>
             <a:endParaRPr lang="en-US"/>
           </a:p>
@@ -4468,7 +4469,7 @@
             <a:fld id="{6D6408A8-6B1B-4CDA-875E-7BEECDBA31DF}" type="datetime1">
               <a:rPr lang="en-US" smtClean="0"/>
               <a:pPr/>
-              <a:t>9/7/22</a:t>
+              <a:t>9/9/22</a:t>
             </a:fld>
             <a:endParaRPr lang="en-US"/>
           </a:p>
@@ -4809,7 +4810,7 @@
             <a:fld id="{C55AAF07-D2F5-4B3C-B443-40DE8C337A77}" type="datetime1">
               <a:rPr lang="en-US" smtClean="0"/>
               <a:pPr/>
-              <a:t>9/7/22</a:t>
+              <a:t>9/9/22</a:t>
             </a:fld>
             <a:endParaRPr lang="en-US"/>
           </a:p>
@@ -6591,6 +6592,183 @@
 </p:sld>
 </file>
 
+<file path=ppt/slides/slide8.xml><?xml version="1.0" encoding="utf-8"?>
+<p:sld xmlns:a="http://schemas.openxmlformats.org/drawingml/2006/main" xmlns:r="http://schemas.openxmlformats.org/officeDocument/2006/relationships" xmlns:p="http://schemas.openxmlformats.org/presentationml/2006/main">
+  <p:cSld>
+    <p:spTree>
+      <p:nvGrpSpPr>
+        <p:cNvPr id="1" name=""/>
+        <p:cNvGrpSpPr/>
+        <p:nvPr/>
+      </p:nvGrpSpPr>
+      <p:grpSpPr>
+        <a:xfrm>
+          <a:off x="0" y="0"/>
+          <a:ext cx="0" cy="0"/>
+          <a:chOff x="0" y="0"/>
+          <a:chExt cx="0" cy="0"/>
+        </a:xfrm>
+      </p:grpSpPr>
+      <p:sp>
+        <p:nvSpPr>
+          <p:cNvPr id="6146" name="Rectangle 2"/>
+          <p:cNvSpPr>
+            <a:spLocks noGrp="1" noChangeArrowheads="1"/>
+          </p:cNvSpPr>
+          <p:nvPr>
+            <p:ph type="title"/>
+            <p:custDataLst>
+              <p:tags r:id="rId1"/>
+            </p:custDataLst>
+          </p:nvPr>
+        </p:nvSpPr>
+        <p:spPr>
+          <a:xfrm>
+            <a:off x="2611808" y="533401"/>
+            <a:ext cx="7958331" cy="762000"/>
+          </a:xfrm>
+        </p:spPr>
+        <p:txBody>
+          <a:bodyPr/>
+          <a:lstStyle/>
+          <a:p>
+            <a:r>
+              <a:rPr lang="en-US" dirty="0"/>
+              <a:t>Friday, Sep. 9</a:t>
+            </a:r>
+          </a:p>
+        </p:txBody>
+      </p:sp>
+      <p:sp>
+        <p:nvSpPr>
+          <p:cNvPr id="6147" name="Rectangle 3"/>
+          <p:cNvSpPr>
+            <a:spLocks noGrp="1" noChangeArrowheads="1"/>
+          </p:cNvSpPr>
+          <p:nvPr>
+            <p:ph idx="1"/>
+            <p:custDataLst>
+              <p:tags r:id="rId2"/>
+            </p:custDataLst>
+          </p:nvPr>
+        </p:nvSpPr>
+        <p:spPr>
+          <a:xfrm>
+            <a:off x="1676400" y="1143000"/>
+            <a:ext cx="8991600" cy="5410200"/>
+          </a:xfrm>
+        </p:spPr>
+        <p:txBody>
+          <a:bodyPr>
+            <a:normAutofit/>
+          </a:bodyPr>
+          <a:lstStyle/>
+          <a:p>
+            <a:r>
+              <a:rPr lang="en-US" dirty="0"/>
+              <a:t>Please join the Discord Server (New invite on Piazza I believe)</a:t>
+            </a:r>
+          </a:p>
+          <a:p>
+            <a:r>
+              <a:rPr lang="en-US" dirty="0"/>
+              <a:t>You should be working on module 1 </a:t>
+            </a:r>
+            <a:r>
+              <a:rPr lang="en-US" dirty="0" err="1"/>
+              <a:t>homeworks</a:t>
+            </a:r>
+            <a:r>
+              <a:rPr lang="en-US" dirty="0"/>
+              <a:t> NOW. ”Tasks” and “Board Games” can be completed now.</a:t>
+            </a:r>
+          </a:p>
+          <a:p>
+            <a:pPr lvl="1"/>
+            <a:r>
+              <a:rPr lang="en-US" dirty="0"/>
+              <a:t>Recommended due date for this is Sep. 12</a:t>
+            </a:r>
+          </a:p>
+          <a:p>
+            <a:pPr lvl="1"/>
+            <a:r>
+              <a:rPr lang="en-US" dirty="0"/>
+              <a:t>You should be averaging 1 homework per week from here on out.</a:t>
+            </a:r>
+          </a:p>
+          <a:p>
+            <a:r>
+              <a:rPr lang="en-US" dirty="0"/>
+              <a:t>“Tasks” </a:t>
+            </a:r>
+            <a:r>
+              <a:rPr lang="en-US" dirty="0" err="1"/>
+              <a:t>autograder</a:t>
+            </a:r>
+            <a:r>
+              <a:rPr lang="en-US" dirty="0"/>
+              <a:t> now accepts ANY valid topological sort</a:t>
+            </a:r>
+          </a:p>
+          <a:p>
+            <a:r>
+              <a:rPr lang="en-US" dirty="0"/>
+              <a:t>We will likely be changing the room for the Tuesday discussion sections…stay tuned.</a:t>
+            </a:r>
+          </a:p>
+          <a:p>
+            <a:pPr lvl="1"/>
+            <a:r>
+              <a:rPr lang="en-US" dirty="0"/>
+              <a:t>Next week’s discussion section will be on the sorting material you 2150 folks missed!!</a:t>
+            </a:r>
+          </a:p>
+          <a:p>
+            <a:r>
+              <a:rPr lang="en-US" dirty="0"/>
+              <a:t>Today we continue module 2. Dijkstra proof of correctness + Prim’s</a:t>
+            </a:r>
+          </a:p>
+        </p:txBody>
+      </p:sp>
+      <p:sp>
+        <p:nvSpPr>
+          <p:cNvPr id="4" name="Slide Number Placeholder 3"/>
+          <p:cNvSpPr>
+            <a:spLocks noGrp="1"/>
+          </p:cNvSpPr>
+          <p:nvPr>
+            <p:ph type="sldNum" sz="quarter" idx="12"/>
+          </p:nvPr>
+        </p:nvSpPr>
+        <p:spPr/>
+        <p:txBody>
+          <a:bodyPr/>
+          <a:lstStyle/>
+          <a:p>
+            <a:fld id="{F26D9103-0C5C-48AC-B68E-3ED2C1647047}" type="slidenum">
+              <a:rPr lang="en-US" smtClean="0"/>
+              <a:pPr/>
+              <a:t>8</a:t>
+            </a:fld>
+            <a:endParaRPr lang="en-US" dirty="0"/>
+          </a:p>
+        </p:txBody>
+      </p:sp>
+    </p:spTree>
+    <p:extLst>
+      <p:ext uri="{BB962C8B-B14F-4D97-AF65-F5344CB8AC3E}">
+        <p14:creationId xmlns:p14="http://schemas.microsoft.com/office/powerpoint/2010/main" val="486385121"/>
+      </p:ext>
+    </p:extLst>
+  </p:cSld>
+  <p:clrMapOvr>
+    <a:masterClrMapping/>
+  </p:clrMapOvr>
+</p:sld>
+</file>
+
 <file path=ppt/tags/tag1.xml><?xml version="1.0" encoding="utf-8"?>
 <p:tagLst xmlns:a="http://schemas.openxmlformats.org/drawingml/2006/main" xmlns:r="http://schemas.openxmlformats.org/officeDocument/2006/relationships" xmlns:p="http://schemas.openxmlformats.org/presentationml/2006/main">
   <p:tag name="_INSTRUCTOR VIEW19C14C36-AC8E-43BC-9DB6-C2AAF774C7DC|PANE__TAG" val="_"/>
@@ -6616,6 +6794,18 @@
 </file>
 
 <file path=ppt/tags/tag13.xml><?xml version="1.0" encoding="utf-8"?>
+<p:tagLst xmlns:a="http://schemas.openxmlformats.org/drawingml/2006/main" xmlns:r="http://schemas.openxmlformats.org/officeDocument/2006/relationships" xmlns:p="http://schemas.openxmlformats.org/presentationml/2006/main">
+  <p:tag name="_INSTRUCTOR VIEW19C14C36-AC8E-43BC-9DB6-C2AAF774C7DC|PANE__TAG" val="_"/>
+</p:tagLst>
+</file>
+
+<file path=ppt/tags/tag14.xml><?xml version="1.0" encoding="utf-8"?>
+<p:tagLst xmlns:a="http://schemas.openxmlformats.org/drawingml/2006/main" xmlns:r="http://schemas.openxmlformats.org/officeDocument/2006/relationships" xmlns:p="http://schemas.openxmlformats.org/presentationml/2006/main">
+  <p:tag name="_INSTRUCTOR VIEW19C14C36-AC8E-43BC-9DB6-C2AAF774C7DC|PANE__TAG" val="_"/>
+</p:tagLst>
+</file>
+
+<file path=ppt/tags/tag15.xml><?xml version="1.0" encoding="utf-8"?>
 <p:tagLst xmlns:a="http://schemas.openxmlformats.org/drawingml/2006/main" xmlns:r="http://schemas.openxmlformats.org/officeDocument/2006/relationships" xmlns:p="http://schemas.openxmlformats.org/presentationml/2006/main">
   <p:tag name="_INSTRUCTOR VIEW19C14C36-AC8E-43BC-9DB6-C2AAF774C7DC|PANE__TAG" val="_"/>
 </p:tagLst>

</xml_diff>